<commit_message>
updated the dates and links in the presentations
</commit_message>
<xml_diff>
--- a/powerpoint/Session1.pptx
+++ b/powerpoint/Session1.pptx
@@ -2955,8 +2955,8 @@
     </dgm:pt>
   </dgm:ptLst>
   <dgm:cxnLst>
+    <dgm:cxn modelId="{7C1D8148-0123-4CFA-A0D7-87331B5E2DEA}" srcId="{95974D49-F6DF-460F-82E7-DC928EBF59EA}" destId="{2E40F792-DD91-48D8-AD91-794DC6C8CDF5}" srcOrd="0" destOrd="0" parTransId="{DA241C61-3E9E-40B5-8962-C02213D2BC44}" sibTransId="{3CFEDC67-90AD-484B-95F5-2F855EA6B658}"/>
     <dgm:cxn modelId="{7E2FB463-21AF-491B-97D9-1BA1B9A5D663}" type="presOf" srcId="{8B1E528D-F277-45BC-AF74-F49409A78254}" destId="{49F48C19-315C-484C-933E-6822A0EDD643}" srcOrd="0" destOrd="0" presId="urn:microsoft.com/office/officeart/2005/8/layout/vList5"/>
-    <dgm:cxn modelId="{7C1D8148-0123-4CFA-A0D7-87331B5E2DEA}" srcId="{95974D49-F6DF-460F-82E7-DC928EBF59EA}" destId="{2E40F792-DD91-48D8-AD91-794DC6C8CDF5}" srcOrd="0" destOrd="0" parTransId="{DA241C61-3E9E-40B5-8962-C02213D2BC44}" sibTransId="{3CFEDC67-90AD-484B-95F5-2F855EA6B658}"/>
     <dgm:cxn modelId="{C7DDF485-969B-487B-9A59-95A1E7A76441}" srcId="{8B1E528D-F277-45BC-AF74-F49409A78254}" destId="{95974D49-F6DF-460F-82E7-DC928EBF59EA}" srcOrd="1" destOrd="0" parTransId="{AC0B7F36-2FAE-405E-A16C-54D1DD977403}" sibTransId="{CE63092B-E540-4B6A-AA51-6501086CF0BF}"/>
     <dgm:cxn modelId="{D4CBCA8F-9246-4865-B8E4-2F9A9E15B999}" type="presOf" srcId="{AC7D689D-90B0-4633-A481-6E852D100C65}" destId="{6E01CFA3-4067-452D-AD4C-A07A32D98561}" srcOrd="0" destOrd="0" presId="urn:microsoft.com/office/officeart/2005/8/layout/vList5"/>
     <dgm:cxn modelId="{3F84E19D-36B4-4CAA-BE75-CE9FE8474E44}" type="presOf" srcId="{95974D49-F6DF-460F-82E7-DC928EBF59EA}" destId="{83809859-737B-46D6-8056-0B51D4541397}" srcOrd="0" destOrd="0" presId="urn:microsoft.com/office/officeart/2005/8/layout/vList5"/>
@@ -19988,7 +19988,7 @@
                 <a:latin typeface="Calibri"/>
                 <a:ea typeface="DejaVu Sans"/>
               </a:rPr>
-              <a:t>Hilary 2022</a:t>
+              <a:t>Trinity 2022</a:t>
             </a:r>
             <a:endParaRPr lang="en-GB" sz="3200" b="0" strike="noStrike" spc="-1" dirty="0">
               <a:latin typeface="Arial"/>
@@ -38443,10 +38443,14 @@
                 <a:latin typeface="Calibri"/>
                 <a:hlinkClick r:id="rId2"/>
               </a:rPr>
-              <a:t>https://github.com/sraorao/MSD_R_course_HT2022/</a:t>
+              <a:t>https://github.com/sraorao/MSD_R_course_TT2022</a:t>
             </a:r>
-            <a:endParaRPr lang="en-GB" sz="2400" b="0" strike="noStrike" spc="-1" dirty="0">
-              <a:latin typeface="Arial"/>
+            <a:endParaRPr lang="en-US" sz="2400" b="0" strike="noStrike" spc="-1" dirty="0">
+              <a:solidFill>
+                <a:srgbClr val="000000"/>
+              </a:solidFill>
+              <a:latin typeface="Calibri"/>
+              <a:ea typeface="DejaVu Sans"/>
             </a:endParaRPr>
           </a:p>
           <a:p>

</xml_diff>